<commit_message>
updated presentation and wireframe concept
</commit_message>
<xml_diff>
--- a/design/MyReviews.pptx
+++ b/design/MyReviews.pptx
@@ -5929,19 +5929,25 @@
           <a:p>
             <a:r>
               <a:rPr lang="en-US" dirty="0"/>
-              <a:t>Provide users with ability to rate and provide comments on Beers and Restaurants</a:t>
-            </a:r>
+              <a:t>Provide users with ability to create personal reviews of Beers and Restaurants that they’ve experienced</a:t>
+            </a:r>
+          </a:p>
+          <a:p>
+            <a:endParaRPr lang="en-US" dirty="0"/>
           </a:p>
           <a:p>
             <a:r>
               <a:rPr lang="en-US" dirty="0"/>
-              <a:t>Provide locations of where to find a particular Restaurant</a:t>
-            </a:r>
+              <a:t>Provide locations of where to find a particular Beer or Restaurant</a:t>
+            </a:r>
+          </a:p>
+          <a:p>
+            <a:endParaRPr lang="en-US" dirty="0"/>
           </a:p>
           <a:p>
             <a:r>
               <a:rPr lang="en-US" dirty="0"/>
-              <a:t>Help users remember previously sampled beers or restaurants</a:t>
+              <a:t>Allow users to view review details of Beers or Restaurants that the have previously entered</a:t>
             </a:r>
           </a:p>
         </p:txBody>
@@ -6072,8 +6078,13 @@
           <a:p>
             <a:r>
               <a:rPr lang="en-US" dirty="0"/>
-              <a:t>If reviewing a restaurant then display google map API for location</a:t>
-            </a:r>
+              <a:t>Display google map API for location of Beer </a:t>
+            </a:r>
+            <a:r>
+              <a:rPr lang="en-US"/>
+              <a:t>or Restaurant</a:t>
+            </a:r>
+            <a:endParaRPr lang="en-US" dirty="0"/>
           </a:p>
         </p:txBody>
       </p:sp>
@@ -6151,11 +6162,95 @@
             <p:ph idx="1"/>
           </p:nvPr>
         </p:nvSpPr>
-        <p:spPr/>
-        <p:txBody>
-          <a:bodyPr/>
-          <a:lstStyle/>
-          <a:p>
+        <p:spPr>
+          <a:xfrm>
+            <a:off x="677334" y="1930400"/>
+            <a:ext cx="8596668" cy="3880773"/>
+          </a:xfrm>
+        </p:spPr>
+        <p:txBody>
+          <a:bodyPr>
+            <a:normAutofit lnSpcReduction="10000"/>
+          </a:bodyPr>
+          <a:lstStyle/>
+          <a:p>
+            <a:r>
+              <a:rPr lang="en-US" dirty="0"/>
+              <a:t>Frontend</a:t>
+            </a:r>
+          </a:p>
+          <a:p>
+            <a:pPr lvl="1"/>
+            <a:r>
+              <a:rPr lang="en-US" dirty="0"/>
+              <a:t>Bootstrap4</a:t>
+            </a:r>
+          </a:p>
+          <a:p>
+            <a:pPr lvl="1"/>
+            <a:r>
+              <a:rPr lang="en-US" dirty="0"/>
+              <a:t>Font Awesome (review ratings)</a:t>
+            </a:r>
+          </a:p>
+          <a:p>
+            <a:pPr lvl="1"/>
+            <a:r>
+              <a:rPr lang="en-US" dirty="0"/>
+              <a:t> (image animation)</a:t>
+            </a:r>
+          </a:p>
+          <a:p>
+            <a:pPr lvl="1"/>
+            <a:endParaRPr lang="en-US" dirty="0"/>
+          </a:p>
+          <a:p>
+            <a:r>
+              <a:rPr lang="en-US" dirty="0"/>
+              <a:t>Backend</a:t>
+            </a:r>
+          </a:p>
+          <a:p>
+            <a:pPr lvl="1"/>
+            <a:r>
+              <a:rPr lang="en-US" dirty="0"/>
+              <a:t>jQuery</a:t>
+            </a:r>
+          </a:p>
+          <a:p>
+            <a:pPr lvl="1"/>
+            <a:r>
+              <a:rPr lang="en-US" dirty="0"/>
+              <a:t>Firebase</a:t>
+            </a:r>
+          </a:p>
+          <a:p>
+            <a:pPr lvl="1"/>
+            <a:r>
+              <a:rPr lang="en-US" dirty="0"/>
+              <a:t>APIs</a:t>
+            </a:r>
+          </a:p>
+          <a:p>
+            <a:pPr lvl="2"/>
+            <a:r>
+              <a:rPr lang="en-US" dirty="0"/>
+              <a:t>Google Maps</a:t>
+            </a:r>
+          </a:p>
+          <a:p>
+            <a:pPr lvl="2"/>
+            <a:r>
+              <a:rPr lang="en-US" dirty="0"/>
+              <a:t>Flickr</a:t>
+            </a:r>
+          </a:p>
+          <a:p>
+            <a:pPr lvl="2"/>
+            <a:endParaRPr lang="en-US" dirty="0"/>
+          </a:p>
+          <a:p>
+            <a:pPr lvl="1"/>
             <a:endParaRPr lang="en-US" dirty="0"/>
           </a:p>
         </p:txBody>
@@ -6294,12 +6389,51 @@
         </p:nvSpPr>
         <p:spPr/>
         <p:txBody>
-          <a:bodyPr/>
+          <a:bodyPr>
+            <a:normAutofit/>
+          </a:bodyPr>
           <a:lstStyle/>
           <a:p>
             <a:r>
               <a:rPr lang="en-US" dirty="0"/>
               <a:t>Demo</a:t>
+            </a:r>
+          </a:p>
+        </p:txBody>
+      </p:sp>
+      <p:sp>
+        <p:nvSpPr>
+          <p:cNvPr id="3" name="Content Placeholder 2">
+            <a:extLst>
+              <a:ext uri="{FF2B5EF4-FFF2-40B4-BE49-F238E27FC236}">
+                <a16:creationId xmlns:a16="http://schemas.microsoft.com/office/drawing/2014/main" id="{5235B661-3A39-4F72-9FBE-13D3C8400288}"/>
+              </a:ext>
+            </a:extLst>
+          </p:cNvPr>
+          <p:cNvSpPr>
+            <a:spLocks noGrp="1"/>
+          </p:cNvSpPr>
+          <p:nvPr>
+            <p:ph idx="1"/>
+          </p:nvPr>
+        </p:nvSpPr>
+        <p:spPr/>
+        <p:txBody>
+          <a:bodyPr/>
+          <a:lstStyle/>
+          <a:p>
+            <a:r>
+              <a:rPr lang="en-US" dirty="0"/>
+              <a:t>Adobe XD (wireframing &amp; concept)</a:t>
+            </a:r>
+          </a:p>
+          <a:p>
+            <a:endParaRPr lang="en-US" dirty="0"/>
+          </a:p>
+          <a:p>
+            <a:r>
+              <a:rPr lang="en-US" dirty="0"/>
+              <a:t>Live Web App Demo</a:t>
             </a:r>
           </a:p>
         </p:txBody>

</xml_diff>